<commit_message>
Changed sizes of PCA plots
</commit_message>
<xml_diff>
--- a/EndofsprintPresentation.pptx
+++ b/EndofsprintPresentation.pptx
@@ -360,7 +360,7 @@
           <a:p>
             <a:fld id="{D57F1E4F-1CFF-5643-939E-02111984F565}" type="slidenum">
               <a:rPr lang="en-US" dirty="0"/>
-              <a:t>‹#›</a:t>
+              <a:t>‹nr.›</a:t>
             </a:fld>
             <a:endParaRPr lang="en-US" dirty="0"/>
           </a:p>
@@ -630,7 +630,7 @@
           <a:p>
             <a:fld id="{D57F1E4F-1CFF-5643-939E-02111984F565}" type="slidenum">
               <a:rPr lang="en-US" dirty="0"/>
-              <a:t>‹#›</a:t>
+              <a:t>‹nr.›</a:t>
             </a:fld>
             <a:endParaRPr lang="en-US" dirty="0"/>
           </a:p>
@@ -819,7 +819,7 @@
           <a:p>
             <a:fld id="{D57F1E4F-1CFF-5643-939E-02111984F565}" type="slidenum">
               <a:rPr lang="en-US" dirty="0"/>
-              <a:t>‹#›</a:t>
+              <a:t>‹nr.›</a:t>
             </a:fld>
             <a:endParaRPr lang="en-US" dirty="0"/>
           </a:p>
@@ -1087,7 +1087,7 @@
           <a:p>
             <a:fld id="{D57F1E4F-1CFF-5643-939E-02111984F565}" type="slidenum">
               <a:rPr lang="en-US" dirty="0"/>
-              <a:t>‹#›</a:t>
+              <a:t>‹nr.›</a:t>
             </a:fld>
             <a:endParaRPr lang="en-US" dirty="0"/>
           </a:p>
@@ -1423,7 +1423,7 @@
           <a:p>
             <a:fld id="{D57F1E4F-1CFF-5643-939E-02111984F565}" type="slidenum">
               <a:rPr lang="en-US" dirty="0"/>
-              <a:t>‹#›</a:t>
+              <a:t>‹nr.›</a:t>
             </a:fld>
             <a:endParaRPr lang="en-US" dirty="0"/>
           </a:p>
@@ -2041,7 +2041,7 @@
           <a:p>
             <a:fld id="{D57F1E4F-1CFF-5643-939E-02111984F565}" type="slidenum">
               <a:rPr lang="en-US" dirty="0"/>
-              <a:t>‹#›</a:t>
+              <a:t>‹nr.›</a:t>
             </a:fld>
             <a:endParaRPr lang="en-US" dirty="0"/>
           </a:p>
@@ -2896,7 +2896,7 @@
           <a:p>
             <a:fld id="{D57F1E4F-1CFF-5643-939E-02111984F565}" type="slidenum">
               <a:rPr lang="en-US" dirty="0"/>
-              <a:t>‹#›</a:t>
+              <a:t>‹nr.›</a:t>
             </a:fld>
             <a:endParaRPr lang="en-US" dirty="0"/>
           </a:p>
@@ -3061,7 +3061,7 @@
           <a:p>
             <a:fld id="{D57F1E4F-1CFF-5643-939E-02111984F565}" type="slidenum">
               <a:rPr lang="en-US" dirty="0"/>
-              <a:t>‹#›</a:t>
+              <a:t>‹nr.›</a:t>
             </a:fld>
             <a:endParaRPr lang="en-US" dirty="0"/>
           </a:p>
@@ -3236,7 +3236,7 @@
           <a:p>
             <a:fld id="{D57F1E4F-1CFF-5643-939E-02111984F565}" type="slidenum">
               <a:rPr lang="en-US" dirty="0"/>
-              <a:t>‹#›</a:t>
+              <a:t>‹nr.›</a:t>
             </a:fld>
             <a:endParaRPr lang="en-US" dirty="0"/>
           </a:p>
@@ -3401,7 +3401,7 @@
           <a:p>
             <a:fld id="{D57F1E4F-1CFF-5643-939E-02111984F565}" type="slidenum">
               <a:rPr lang="en-US" dirty="0"/>
-              <a:t>‹#›</a:t>
+              <a:t>‹nr.›</a:t>
             </a:fld>
             <a:endParaRPr lang="en-US" dirty="0"/>
           </a:p>
@@ -3643,7 +3643,7 @@
           <a:p>
             <a:fld id="{D57F1E4F-1CFF-5643-939E-02111984F565}" type="slidenum">
               <a:rPr lang="en-US" dirty="0"/>
-              <a:t>‹#›</a:t>
+              <a:t>‹nr.›</a:t>
             </a:fld>
             <a:endParaRPr lang="en-US" dirty="0"/>
           </a:p>
@@ -3930,7 +3930,7 @@
           <a:p>
             <a:fld id="{D57F1E4F-1CFF-5643-939E-02111984F565}" type="slidenum">
               <a:rPr lang="en-US" dirty="0"/>
-              <a:t>‹#›</a:t>
+              <a:t>‹nr.›</a:t>
             </a:fld>
             <a:endParaRPr lang="en-US" dirty="0"/>
           </a:p>
@@ -4369,7 +4369,7 @@
           <a:p>
             <a:fld id="{D57F1E4F-1CFF-5643-939E-02111984F565}" type="slidenum">
               <a:rPr lang="en-US" dirty="0"/>
-              <a:t>‹#›</a:t>
+              <a:t>‹nr.›</a:t>
             </a:fld>
             <a:endParaRPr lang="en-US" dirty="0"/>
           </a:p>
@@ -4482,7 +4482,7 @@
           <a:p>
             <a:fld id="{D57F1E4F-1CFF-5643-939E-02111984F565}" type="slidenum">
               <a:rPr lang="en-US" dirty="0"/>
-              <a:t>‹#›</a:t>
+              <a:t>‹nr.›</a:t>
             </a:fld>
             <a:endParaRPr lang="en-US" dirty="0"/>
           </a:p>
@@ -4572,7 +4572,7 @@
           <a:p>
             <a:fld id="{D57F1E4F-1CFF-5643-939E-02111984F565}" type="slidenum">
               <a:rPr lang="en-US" dirty="0"/>
-              <a:t>‹#›</a:t>
+              <a:t>‹nr.›</a:t>
             </a:fld>
             <a:endParaRPr lang="en-US" dirty="0"/>
           </a:p>
@@ -4846,7 +4846,7 @@
           <a:p>
             <a:fld id="{D57F1E4F-1CFF-5643-939E-02111984F565}" type="slidenum">
               <a:rPr lang="en-US" dirty="0"/>
-              <a:t>‹#›</a:t>
+              <a:t>‹nr.›</a:t>
             </a:fld>
             <a:endParaRPr lang="en-US" dirty="0"/>
           </a:p>
@@ -5116,7 +5116,7 @@
           <a:p>
             <a:fld id="{D57F1E4F-1CFF-5643-939E-02111984F565}" type="slidenum">
               <a:rPr lang="en-US" dirty="0"/>
-              <a:t>‹#›</a:t>
+              <a:t>‹nr.›</a:t>
             </a:fld>
             <a:endParaRPr lang="en-US" dirty="0"/>
           </a:p>
@@ -5577,7 +5577,7 @@
           <a:p>
             <a:fld id="{D57F1E4F-1CFF-5643-939E-02111984F565}" type="slidenum">
               <a:rPr lang="en-US" dirty="0"/>
-              <a:t>‹#›</a:t>
+              <a:t>‹nr.›</a:t>
             </a:fld>
             <a:endParaRPr lang="en-US" dirty="0"/>
           </a:p>
@@ -10870,7 +10870,12 @@
             <p:ph idx="1"/>
           </p:nvPr>
         </p:nvSpPr>
-        <p:spPr/>
+        <p:spPr>
+          <a:xfrm>
+            <a:off x="1104293" y="1331259"/>
+            <a:ext cx="8946541" cy="4195481"/>
+          </a:xfrm>
+        </p:spPr>
         <p:txBody>
           <a:bodyPr vert="horz" lIns="91440" tIns="45720" rIns="91440" bIns="45720" rtlCol="0" anchor="t">
             <a:normAutofit/>
@@ -10906,8 +10911,8 @@
         </p:blipFill>
         <p:spPr>
           <a:xfrm>
-            <a:off x="1104900" y="3630277"/>
-            <a:ext cx="4394200" cy="2708946"/>
+            <a:off x="646111" y="3204519"/>
+            <a:ext cx="4852989" cy="3134704"/>
           </a:xfrm>
           <a:prstGeom prst="rect">
             <a:avLst/>
@@ -10936,8 +10941,8 @@
         </p:blipFill>
         <p:spPr>
           <a:xfrm>
-            <a:off x="6269567" y="3630277"/>
-            <a:ext cx="4394200" cy="2708946"/>
+            <a:off x="6269567" y="3204519"/>
+            <a:ext cx="4818140" cy="3134704"/>
           </a:xfrm>
           <a:prstGeom prst="rect">
             <a:avLst/>
@@ -11018,7 +11023,12 @@
             <p:ph idx="1"/>
           </p:nvPr>
         </p:nvSpPr>
-        <p:spPr/>
+        <p:spPr>
+          <a:xfrm>
+            <a:off x="1104900" y="1459793"/>
+            <a:ext cx="8946541" cy="4195481"/>
+          </a:xfrm>
+        </p:spPr>
         <p:txBody>
           <a:bodyPr vert="horz" lIns="91440" tIns="45720" rIns="91440" bIns="45720" rtlCol="0" anchor="t">
             <a:normAutofit/>
@@ -11084,8 +11094,8 @@
         </p:blipFill>
         <p:spPr>
           <a:xfrm>
-            <a:off x="1104900" y="3630277"/>
-            <a:ext cx="4351866" cy="2708946"/>
+            <a:off x="1104899" y="2143742"/>
+            <a:ext cx="8607511" cy="4195481"/>
           </a:xfrm>
           <a:prstGeom prst="rect">
             <a:avLst/>

</xml_diff>